<commit_message>
[IMP] final_project: olivers id added
</commit_message>
<xml_diff>
--- a/final_project/10. Presentacion.pptx
+++ b/final_project/10. Presentacion.pptx
@@ -227,7 +227,7 @@
           <a:p>
             <a:fld id="{75438802-F28A-42D1-9BCA-40E34B52D6F0}" type="datetimeFigureOut">
               <a:rPr lang="en-US" smtClean="0"/>
-              <a:t>4/9/2020</a:t>
+              <a:t>4/10/2020</a:t>
             </a:fld>
             <a:endParaRPr lang="en-US" dirty="0"/>
           </a:p>
@@ -404,7 +404,7 @@
           <a:p>
             <a:fld id="{6865794D-BDB5-4811-AA4A-B25E4EF28521}" type="datetimeFigureOut">
               <a:rPr lang="en-US" smtClean="0"/>
-              <a:t>4/9/2020</a:t>
+              <a:t>4/10/2020</a:t>
             </a:fld>
             <a:endParaRPr lang="en-US" dirty="0"/>
           </a:p>
@@ -896,7 +896,7 @@
           <a:noFill/>
           <a:extLst>
             <a:ext uri="{909E8E84-426E-40dd-AFC4-6F175D3DCCD1}">
-              <a14:hiddenFill xmlns:a14="http://schemas.microsoft.com/office/drawing/2010/main" xmlns="">
+              <a14:hiddenFill xmlns="" xmlns:a14="http://schemas.microsoft.com/office/drawing/2010/main">
                 <a:solidFill>
                   <a:srgbClr val="FFFFFF"/>
                 </a:solidFill>
@@ -955,7 +955,7 @@
             </a:ln>
             <a:extLst>
               <a:ext uri="{91240B29-F687-4f45-9708-019B960494DF}">
-                <a14:hiddenLine xmlns:a14="http://schemas.microsoft.com/office/drawing/2010/main" xmlns="" w="9525">
+                <a14:hiddenLine xmlns="" xmlns:a14="http://schemas.microsoft.com/office/drawing/2010/main" w="9525">
                   <a:solidFill>
                     <a:srgbClr val="000000"/>
                   </a:solidFill>
@@ -1045,7 +1045,7 @@
             </a:ln>
             <a:extLst>
               <a:ext uri="{91240B29-F687-4f45-9708-019B960494DF}">
-                <a14:hiddenLine xmlns:a14="http://schemas.microsoft.com/office/drawing/2010/main" xmlns="" w="9525">
+                <a14:hiddenLine xmlns="" xmlns:a14="http://schemas.microsoft.com/office/drawing/2010/main" w="9525">
                   <a:solidFill>
                     <a:srgbClr val="000000"/>
                   </a:solidFill>
@@ -1135,7 +1135,7 @@
             </a:ln>
             <a:extLst>
               <a:ext uri="{91240B29-F687-4f45-9708-019B960494DF}">
-                <a14:hiddenLine xmlns:a14="http://schemas.microsoft.com/office/drawing/2010/main" xmlns="" w="9525">
+                <a14:hiddenLine xmlns="" xmlns:a14="http://schemas.microsoft.com/office/drawing/2010/main" w="9525">
                   <a:solidFill>
                     <a:srgbClr val="000000"/>
                   </a:solidFill>
@@ -1169,7 +1169,7 @@
             </a:ln>
             <a:extLst>
               <a:ext uri="{91240B29-F687-4f45-9708-019B960494DF}">
-                <a14:hiddenLine xmlns:a14="http://schemas.microsoft.com/office/drawing/2010/main" xmlns="" w="9525">
+                <a14:hiddenLine xmlns="" xmlns:a14="http://schemas.microsoft.com/office/drawing/2010/main" w="9525">
                   <a:solidFill>
                     <a:srgbClr val="000000"/>
                   </a:solidFill>
@@ -1259,7 +1259,7 @@
             </a:ln>
             <a:extLst>
               <a:ext uri="{91240B29-F687-4f45-9708-019B960494DF}">
-                <a14:hiddenLine xmlns:a14="http://schemas.microsoft.com/office/drawing/2010/main" xmlns="" w="9525">
+                <a14:hiddenLine xmlns="" xmlns:a14="http://schemas.microsoft.com/office/drawing/2010/main" w="9525">
                   <a:solidFill>
                     <a:srgbClr val="000000"/>
                   </a:solidFill>
@@ -1321,7 +1321,7 @@
             </a:ln>
             <a:extLst>
               <a:ext uri="{91240B29-F687-4f45-9708-019B960494DF}">
-                <a14:hiddenLine xmlns:a14="http://schemas.microsoft.com/office/drawing/2010/main" xmlns="" w="9525">
+                <a14:hiddenLine xmlns="" xmlns:a14="http://schemas.microsoft.com/office/drawing/2010/main" w="9525">
                   <a:solidFill>
                     <a:srgbClr val="000000"/>
                   </a:solidFill>
@@ -1383,7 +1383,7 @@
             </a:ln>
             <a:extLst>
               <a:ext uri="{91240B29-F687-4f45-9708-019B960494DF}">
-                <a14:hiddenLine xmlns:a14="http://schemas.microsoft.com/office/drawing/2010/main" xmlns="" w="9525">
+                <a14:hiddenLine xmlns="" xmlns:a14="http://schemas.microsoft.com/office/drawing/2010/main" w="9525">
                   <a:solidFill>
                     <a:srgbClr val="000000"/>
                   </a:solidFill>
@@ -1473,7 +1473,7 @@
             </a:ln>
             <a:extLst>
               <a:ext uri="{91240B29-F687-4f45-9708-019B960494DF}">
-                <a14:hiddenLine xmlns:a14="http://schemas.microsoft.com/office/drawing/2010/main" xmlns="" w="9525">
+                <a14:hiddenLine xmlns="" xmlns:a14="http://schemas.microsoft.com/office/drawing/2010/main" w="9525">
                   <a:solidFill>
                     <a:srgbClr val="000000"/>
                   </a:solidFill>
@@ -1535,7 +1535,7 @@
             </a:ln>
             <a:extLst>
               <a:ext uri="{91240B29-F687-4f45-9708-019B960494DF}">
-                <a14:hiddenLine xmlns:a14="http://schemas.microsoft.com/office/drawing/2010/main" xmlns="" w="9525">
+                <a14:hiddenLine xmlns="" xmlns:a14="http://schemas.microsoft.com/office/drawing/2010/main" w="9525">
                   <a:solidFill>
                     <a:srgbClr val="000000"/>
                   </a:solidFill>
@@ -1597,7 +1597,7 @@
             </a:ln>
             <a:extLst>
               <a:ext uri="{91240B29-F687-4f45-9708-019B960494DF}">
-                <a14:hiddenLine xmlns:a14="http://schemas.microsoft.com/office/drawing/2010/main" xmlns="" w="9525">
+                <a14:hiddenLine xmlns="" xmlns:a14="http://schemas.microsoft.com/office/drawing/2010/main" w="9525">
                   <a:solidFill>
                     <a:srgbClr val="000000"/>
                   </a:solidFill>
@@ -1687,7 +1687,7 @@
             </a:ln>
             <a:extLst>
               <a:ext uri="{91240B29-F687-4f45-9708-019B960494DF}">
-                <a14:hiddenLine xmlns:a14="http://schemas.microsoft.com/office/drawing/2010/main" xmlns="" w="9525">
+                <a14:hiddenLine xmlns="" xmlns:a14="http://schemas.microsoft.com/office/drawing/2010/main" w="9525">
                   <a:solidFill>
                     <a:srgbClr val="000000"/>
                   </a:solidFill>
@@ -1777,7 +1777,7 @@
             </a:ln>
             <a:extLst>
               <a:ext uri="{91240B29-F687-4f45-9708-019B960494DF}">
-                <a14:hiddenLine xmlns:a14="http://schemas.microsoft.com/office/drawing/2010/main" xmlns="" w="9525">
+                <a14:hiddenLine xmlns="" xmlns:a14="http://schemas.microsoft.com/office/drawing/2010/main" w="9525">
                   <a:solidFill>
                     <a:srgbClr val="000000"/>
                   </a:solidFill>
@@ -1839,7 +1839,7 @@
             </a:ln>
             <a:extLst>
               <a:ext uri="{91240B29-F687-4f45-9708-019B960494DF}">
-                <a14:hiddenLine xmlns:a14="http://schemas.microsoft.com/office/drawing/2010/main" xmlns="" w="9525">
+                <a14:hiddenLine xmlns="" xmlns:a14="http://schemas.microsoft.com/office/drawing/2010/main" w="9525">
                   <a:solidFill>
                     <a:srgbClr val="000000"/>
                   </a:solidFill>
@@ -1949,7 +1949,7 @@
             </a:ln>
             <a:extLst>
               <a:ext uri="{91240B29-F687-4f45-9708-019B960494DF}">
-                <a14:hiddenLine xmlns:a14="http://schemas.microsoft.com/office/drawing/2010/main" xmlns="" w="9525">
+                <a14:hiddenLine xmlns="" xmlns:a14="http://schemas.microsoft.com/office/drawing/2010/main" w="9525">
                   <a:solidFill>
                     <a:srgbClr val="000000"/>
                   </a:solidFill>
@@ -2011,7 +2011,7 @@
             </a:ln>
             <a:extLst>
               <a:ext uri="{91240B29-F687-4f45-9708-019B960494DF}">
-                <a14:hiddenLine xmlns:a14="http://schemas.microsoft.com/office/drawing/2010/main" xmlns="" w="9525">
+                <a14:hiddenLine xmlns="" xmlns:a14="http://schemas.microsoft.com/office/drawing/2010/main" w="9525">
                   <a:solidFill>
                     <a:srgbClr val="000000"/>
                   </a:solidFill>
@@ -2101,7 +2101,7 @@
             </a:ln>
             <a:extLst>
               <a:ext uri="{91240B29-F687-4f45-9708-019B960494DF}">
-                <a14:hiddenLine xmlns:a14="http://schemas.microsoft.com/office/drawing/2010/main" xmlns="" w="9525">
+                <a14:hiddenLine xmlns="" xmlns:a14="http://schemas.microsoft.com/office/drawing/2010/main" w="9525">
                   <a:solidFill>
                     <a:srgbClr val="000000"/>
                   </a:solidFill>
@@ -2191,7 +2191,7 @@
             </a:ln>
             <a:extLst>
               <a:ext uri="{91240B29-F687-4f45-9708-019B960494DF}">
-                <a14:hiddenLine xmlns:a14="http://schemas.microsoft.com/office/drawing/2010/main" xmlns="" w="9525">
+                <a14:hiddenLine xmlns="" xmlns:a14="http://schemas.microsoft.com/office/drawing/2010/main" w="9525">
                   <a:solidFill>
                     <a:srgbClr val="000000"/>
                   </a:solidFill>
@@ -2253,7 +2253,7 @@
             </a:ln>
             <a:extLst>
               <a:ext uri="{91240B29-F687-4f45-9708-019B960494DF}">
-                <a14:hiddenLine xmlns:a14="http://schemas.microsoft.com/office/drawing/2010/main" xmlns="" w="9525">
+                <a14:hiddenLine xmlns="" xmlns:a14="http://schemas.microsoft.com/office/drawing/2010/main" w="9525">
                   <a:solidFill>
                     <a:srgbClr val="000000"/>
                   </a:solidFill>
@@ -2343,7 +2343,7 @@
             </a:ln>
             <a:extLst>
               <a:ext uri="{91240B29-F687-4f45-9708-019B960494DF}">
-                <a14:hiddenLine xmlns:a14="http://schemas.microsoft.com/office/drawing/2010/main" xmlns="" w="9525">
+                <a14:hiddenLine xmlns="" xmlns:a14="http://schemas.microsoft.com/office/drawing/2010/main" w="9525">
                   <a:solidFill>
                     <a:srgbClr val="000000"/>
                   </a:solidFill>
@@ -2433,7 +2433,7 @@
             </a:ln>
             <a:extLst>
               <a:ext uri="{91240B29-F687-4f45-9708-019B960494DF}">
-                <a14:hiddenLine xmlns:a14="http://schemas.microsoft.com/office/drawing/2010/main" xmlns="" w="9525">
+                <a14:hiddenLine xmlns="" xmlns:a14="http://schemas.microsoft.com/office/drawing/2010/main" w="9525">
                   <a:solidFill>
                     <a:srgbClr val="000000"/>
                   </a:solidFill>
@@ -2489,7 +2489,7 @@
             </a:ln>
             <a:extLst>
               <a:ext uri="{91240B29-F687-4f45-9708-019B960494DF}">
-                <a14:hiddenLine xmlns:a14="http://schemas.microsoft.com/office/drawing/2010/main" xmlns="" w="9525">
+                <a14:hiddenLine xmlns="" xmlns:a14="http://schemas.microsoft.com/office/drawing/2010/main" w="9525">
                   <a:solidFill>
                     <a:srgbClr val="000000"/>
                   </a:solidFill>
@@ -2579,7 +2579,7 @@
             </a:ln>
             <a:extLst>
               <a:ext uri="{91240B29-F687-4f45-9708-019B960494DF}">
-                <a14:hiddenLine xmlns:a14="http://schemas.microsoft.com/office/drawing/2010/main" xmlns="" w="9525">
+                <a14:hiddenLine xmlns="" xmlns:a14="http://schemas.microsoft.com/office/drawing/2010/main" w="9525">
                   <a:solidFill>
                     <a:srgbClr val="000000"/>
                   </a:solidFill>
@@ -2635,7 +2635,7 @@
             </a:ln>
             <a:extLst>
               <a:ext uri="{91240B29-F687-4f45-9708-019B960494DF}">
-                <a14:hiddenLine xmlns:a14="http://schemas.microsoft.com/office/drawing/2010/main" xmlns="" w="9525">
+                <a14:hiddenLine xmlns="" xmlns:a14="http://schemas.microsoft.com/office/drawing/2010/main" w="9525">
                   <a:solidFill>
                     <a:srgbClr val="000000"/>
                   </a:solidFill>
@@ -2725,7 +2725,7 @@
             </a:ln>
             <a:extLst>
               <a:ext uri="{91240B29-F687-4f45-9708-019B960494DF}">
-                <a14:hiddenLine xmlns:a14="http://schemas.microsoft.com/office/drawing/2010/main" xmlns="" w="9525">
+                <a14:hiddenLine xmlns="" xmlns:a14="http://schemas.microsoft.com/office/drawing/2010/main" w="9525">
                   <a:solidFill>
                     <a:srgbClr val="000000"/>
                   </a:solidFill>
@@ -2793,7 +2793,7 @@
             </a:ln>
             <a:extLst>
               <a:ext uri="{91240B29-F687-4f45-9708-019B960494DF}">
-                <a14:hiddenLine xmlns:a14="http://schemas.microsoft.com/office/drawing/2010/main" xmlns="" w="9525">
+                <a14:hiddenLine xmlns="" xmlns:a14="http://schemas.microsoft.com/office/drawing/2010/main" w="9525">
                   <a:solidFill>
                     <a:srgbClr val="000000"/>
                   </a:solidFill>
@@ -2883,7 +2883,7 @@
             </a:ln>
             <a:extLst>
               <a:ext uri="{91240B29-F687-4f45-9708-019B960494DF}">
-                <a14:hiddenLine xmlns:a14="http://schemas.microsoft.com/office/drawing/2010/main" xmlns="" w="9525">
+                <a14:hiddenLine xmlns="" xmlns:a14="http://schemas.microsoft.com/office/drawing/2010/main" w="9525">
                   <a:solidFill>
                     <a:srgbClr val="000000"/>
                   </a:solidFill>
@@ -2951,7 +2951,7 @@
             </a:ln>
             <a:extLst>
               <a:ext uri="{91240B29-F687-4f45-9708-019B960494DF}">
-                <a14:hiddenLine xmlns:a14="http://schemas.microsoft.com/office/drawing/2010/main" xmlns="" w="9525">
+                <a14:hiddenLine xmlns="" xmlns:a14="http://schemas.microsoft.com/office/drawing/2010/main" w="9525">
                   <a:solidFill>
                     <a:srgbClr val="000000"/>
                   </a:solidFill>
@@ -3041,7 +3041,7 @@
             </a:ln>
             <a:extLst>
               <a:ext uri="{91240B29-F687-4f45-9708-019B960494DF}">
-                <a14:hiddenLine xmlns:a14="http://schemas.microsoft.com/office/drawing/2010/main" xmlns="" w="9525">
+                <a14:hiddenLine xmlns="" xmlns:a14="http://schemas.microsoft.com/office/drawing/2010/main" w="9525">
                   <a:solidFill>
                     <a:srgbClr val="000000"/>
                   </a:solidFill>
@@ -3075,7 +3075,7 @@
             </a:ln>
             <a:extLst>
               <a:ext uri="{91240B29-F687-4f45-9708-019B960494DF}">
-                <a14:hiddenLine xmlns:a14="http://schemas.microsoft.com/office/drawing/2010/main" xmlns="" w="9525">
+                <a14:hiddenLine xmlns="" xmlns:a14="http://schemas.microsoft.com/office/drawing/2010/main" w="9525">
                   <a:solidFill>
                     <a:srgbClr val="000000"/>
                   </a:solidFill>
@@ -3165,7 +3165,7 @@
             </a:ln>
             <a:extLst>
               <a:ext uri="{91240B29-F687-4f45-9708-019B960494DF}">
-                <a14:hiddenLine xmlns:a14="http://schemas.microsoft.com/office/drawing/2010/main" xmlns="" w="9525">
+                <a14:hiddenLine xmlns="" xmlns:a14="http://schemas.microsoft.com/office/drawing/2010/main" w="9525">
                   <a:solidFill>
                     <a:srgbClr val="000000"/>
                   </a:solidFill>
@@ -3227,7 +3227,7 @@
             </a:ln>
             <a:extLst>
               <a:ext uri="{91240B29-F687-4f45-9708-019B960494DF}">
-                <a14:hiddenLine xmlns:a14="http://schemas.microsoft.com/office/drawing/2010/main" xmlns="" w="9525">
+                <a14:hiddenLine xmlns="" xmlns:a14="http://schemas.microsoft.com/office/drawing/2010/main" w="9525">
                   <a:solidFill>
                     <a:srgbClr val="000000"/>
                   </a:solidFill>
@@ -3289,7 +3289,7 @@
             </a:ln>
             <a:extLst>
               <a:ext uri="{91240B29-F687-4f45-9708-019B960494DF}">
-                <a14:hiddenLine xmlns:a14="http://schemas.microsoft.com/office/drawing/2010/main" xmlns="" w="9525">
+                <a14:hiddenLine xmlns="" xmlns:a14="http://schemas.microsoft.com/office/drawing/2010/main" w="9525">
                   <a:solidFill>
                     <a:srgbClr val="000000"/>
                   </a:solidFill>
@@ -3379,7 +3379,7 @@
             </a:ln>
             <a:extLst>
               <a:ext uri="{91240B29-F687-4f45-9708-019B960494DF}">
-                <a14:hiddenLine xmlns:a14="http://schemas.microsoft.com/office/drawing/2010/main" xmlns="" w="9525">
+                <a14:hiddenLine xmlns="" xmlns:a14="http://schemas.microsoft.com/office/drawing/2010/main" w="9525">
                   <a:solidFill>
                     <a:srgbClr val="000000"/>
                   </a:solidFill>
@@ -3447,7 +3447,7 @@
             </a:ln>
             <a:extLst>
               <a:ext uri="{91240B29-F687-4f45-9708-019B960494DF}">
-                <a14:hiddenLine xmlns:a14="http://schemas.microsoft.com/office/drawing/2010/main" xmlns="" w="9525">
+                <a14:hiddenLine xmlns="" xmlns:a14="http://schemas.microsoft.com/office/drawing/2010/main" w="9525">
                   <a:solidFill>
                     <a:srgbClr val="000000"/>
                   </a:solidFill>
@@ -3509,7 +3509,7 @@
             </a:ln>
             <a:extLst>
               <a:ext uri="{91240B29-F687-4f45-9708-019B960494DF}">
-                <a14:hiddenLine xmlns:a14="http://schemas.microsoft.com/office/drawing/2010/main" xmlns="" w="9525">
+                <a14:hiddenLine xmlns="" xmlns:a14="http://schemas.microsoft.com/office/drawing/2010/main" w="9525">
                   <a:solidFill>
                     <a:srgbClr val="000000"/>
                   </a:solidFill>
@@ -3599,7 +3599,7 @@
             </a:ln>
             <a:extLst>
               <a:ext uri="{91240B29-F687-4f45-9708-019B960494DF}">
-                <a14:hiddenLine xmlns:a14="http://schemas.microsoft.com/office/drawing/2010/main" xmlns="" w="9525">
+                <a14:hiddenLine xmlns="" xmlns:a14="http://schemas.microsoft.com/office/drawing/2010/main" w="9525">
                   <a:solidFill>
                     <a:srgbClr val="000000"/>
                   </a:solidFill>
@@ -3661,7 +3661,7 @@
             </a:ln>
             <a:extLst>
               <a:ext uri="{91240B29-F687-4f45-9708-019B960494DF}">
-                <a14:hiddenLine xmlns:a14="http://schemas.microsoft.com/office/drawing/2010/main" xmlns="" w="9525">
+                <a14:hiddenLine xmlns="" xmlns:a14="http://schemas.microsoft.com/office/drawing/2010/main" w="9525">
                   <a:solidFill>
                     <a:srgbClr val="000000"/>
                   </a:solidFill>
@@ -3751,7 +3751,7 @@
             </a:ln>
             <a:extLst>
               <a:ext uri="{91240B29-F687-4f45-9708-019B960494DF}">
-                <a14:hiddenLine xmlns:a14="http://schemas.microsoft.com/office/drawing/2010/main" xmlns="" w="9525">
+                <a14:hiddenLine xmlns="" xmlns:a14="http://schemas.microsoft.com/office/drawing/2010/main" w="9525">
                   <a:solidFill>
                     <a:srgbClr val="000000"/>
                   </a:solidFill>
@@ -3813,7 +3813,7 @@
             </a:ln>
             <a:extLst>
               <a:ext uri="{91240B29-F687-4f45-9708-019B960494DF}">
-                <a14:hiddenLine xmlns:a14="http://schemas.microsoft.com/office/drawing/2010/main" xmlns="" w="9525">
+                <a14:hiddenLine xmlns="" xmlns:a14="http://schemas.microsoft.com/office/drawing/2010/main" w="9525">
                   <a:solidFill>
                     <a:srgbClr val="000000"/>
                   </a:solidFill>
@@ -3903,7 +3903,7 @@
             </a:ln>
             <a:extLst>
               <a:ext uri="{91240B29-F687-4f45-9708-019B960494DF}">
-                <a14:hiddenLine xmlns:a14="http://schemas.microsoft.com/office/drawing/2010/main" xmlns="" w="9525">
+                <a14:hiddenLine xmlns="" xmlns:a14="http://schemas.microsoft.com/office/drawing/2010/main" w="9525">
                   <a:solidFill>
                     <a:srgbClr val="000000"/>
                   </a:solidFill>
@@ -3937,7 +3937,7 @@
             </a:ln>
             <a:extLst>
               <a:ext uri="{91240B29-F687-4f45-9708-019B960494DF}">
-                <a14:hiddenLine xmlns:a14="http://schemas.microsoft.com/office/drawing/2010/main" xmlns="" w="9525">
+                <a14:hiddenLine xmlns="" xmlns:a14="http://schemas.microsoft.com/office/drawing/2010/main" w="9525">
                   <a:solidFill>
                     <a:srgbClr val="000000"/>
                   </a:solidFill>
@@ -4002,7 +4002,7 @@
             </a:ln>
             <a:extLst>
               <a:ext uri="{91240B29-F687-4f45-9708-019B960494DF}">
-                <a14:hiddenLine xmlns:a14="http://schemas.microsoft.com/office/drawing/2010/main" xmlns="" w="9525">
+                <a14:hiddenLine xmlns="" xmlns:a14="http://schemas.microsoft.com/office/drawing/2010/main" w="9525">
                   <a:solidFill>
                     <a:srgbClr val="000000"/>
                   </a:solidFill>
@@ -4092,7 +4092,7 @@
             </a:ln>
             <a:extLst>
               <a:ext uri="{91240B29-F687-4f45-9708-019B960494DF}">
-                <a14:hiddenLine xmlns:a14="http://schemas.microsoft.com/office/drawing/2010/main" xmlns="" w="9525">
+                <a14:hiddenLine xmlns="" xmlns:a14="http://schemas.microsoft.com/office/drawing/2010/main" w="9525">
                   <a:solidFill>
                     <a:srgbClr val="000000"/>
                   </a:solidFill>
@@ -4154,7 +4154,7 @@
             </a:ln>
             <a:extLst>
               <a:ext uri="{91240B29-F687-4f45-9708-019B960494DF}">
-                <a14:hiddenLine xmlns:a14="http://schemas.microsoft.com/office/drawing/2010/main" xmlns="" w="9525">
+                <a14:hiddenLine xmlns="" xmlns:a14="http://schemas.microsoft.com/office/drawing/2010/main" w="9525">
                   <a:solidFill>
                     <a:srgbClr val="000000"/>
                   </a:solidFill>
@@ -4244,7 +4244,7 @@
             </a:ln>
             <a:extLst>
               <a:ext uri="{91240B29-F687-4f45-9708-019B960494DF}">
-                <a14:hiddenLine xmlns:a14="http://schemas.microsoft.com/office/drawing/2010/main" xmlns="" w="9525">
+                <a14:hiddenLine xmlns="" xmlns:a14="http://schemas.microsoft.com/office/drawing/2010/main" w="9525">
                   <a:solidFill>
                     <a:srgbClr val="000000"/>
                   </a:solidFill>
@@ -4334,7 +4334,7 @@
             </a:ln>
             <a:extLst>
               <a:ext uri="{91240B29-F687-4f45-9708-019B960494DF}">
-                <a14:hiddenLine xmlns:a14="http://schemas.microsoft.com/office/drawing/2010/main" xmlns="" w="9525">
+                <a14:hiddenLine xmlns="" xmlns:a14="http://schemas.microsoft.com/office/drawing/2010/main" w="9525">
                   <a:solidFill>
                     <a:srgbClr val="000000"/>
                   </a:solidFill>
@@ -4399,7 +4399,7 @@
             </a:ln>
             <a:extLst>
               <a:ext uri="{91240B29-F687-4f45-9708-019B960494DF}">
-                <a14:hiddenLine xmlns:a14="http://schemas.microsoft.com/office/drawing/2010/main" xmlns="" w="9525">
+                <a14:hiddenLine xmlns="" xmlns:a14="http://schemas.microsoft.com/office/drawing/2010/main" w="9525">
                   <a:solidFill>
                     <a:srgbClr val="000000"/>
                   </a:solidFill>
@@ -4461,7 +4461,7 @@
             </a:ln>
             <a:extLst>
               <a:ext uri="{91240B29-F687-4f45-9708-019B960494DF}">
-                <a14:hiddenLine xmlns:a14="http://schemas.microsoft.com/office/drawing/2010/main" xmlns="" w="9525">
+                <a14:hiddenLine xmlns="" xmlns:a14="http://schemas.microsoft.com/office/drawing/2010/main" w="9525">
                   <a:solidFill>
                     <a:srgbClr val="000000"/>
                   </a:solidFill>
@@ -4551,7 +4551,7 @@
             </a:ln>
             <a:extLst>
               <a:ext uri="{91240B29-F687-4f45-9708-019B960494DF}">
-                <a14:hiddenLine xmlns:a14="http://schemas.microsoft.com/office/drawing/2010/main" xmlns="" w="9525">
+                <a14:hiddenLine xmlns="" xmlns:a14="http://schemas.microsoft.com/office/drawing/2010/main" w="9525">
                   <a:solidFill>
                     <a:srgbClr val="000000"/>
                   </a:solidFill>
@@ -4641,7 +4641,7 @@
             </a:ln>
             <a:extLst>
               <a:ext uri="{91240B29-F687-4f45-9708-019B960494DF}">
-                <a14:hiddenLine xmlns:a14="http://schemas.microsoft.com/office/drawing/2010/main" xmlns="" w="9525">
+                <a14:hiddenLine xmlns="" xmlns:a14="http://schemas.microsoft.com/office/drawing/2010/main" w="9525">
                   <a:solidFill>
                     <a:srgbClr val="000000"/>
                   </a:solidFill>
@@ -4703,7 +4703,7 @@
             </a:ln>
             <a:extLst>
               <a:ext uri="{91240B29-F687-4f45-9708-019B960494DF}">
-                <a14:hiddenLine xmlns:a14="http://schemas.microsoft.com/office/drawing/2010/main" xmlns="" w="9525">
+                <a14:hiddenLine xmlns="" xmlns:a14="http://schemas.microsoft.com/office/drawing/2010/main" w="9525">
                   <a:solidFill>
                     <a:srgbClr val="000000"/>
                   </a:solidFill>
@@ -4823,7 +4823,7 @@
             </a:ln>
             <a:extLst>
               <a:ext uri="{91240B29-F687-4f45-9708-019B960494DF}">
-                <a14:hiddenLine xmlns:a14="http://schemas.microsoft.com/office/drawing/2010/main" xmlns="" w="9525">
+                <a14:hiddenLine xmlns="" xmlns:a14="http://schemas.microsoft.com/office/drawing/2010/main" w="9525">
                   <a:solidFill>
                     <a:srgbClr val="000000"/>
                   </a:solidFill>
@@ -4891,7 +4891,7 @@
             </a:ln>
             <a:extLst>
               <a:ext uri="{91240B29-F687-4f45-9708-019B960494DF}">
-                <a14:hiddenLine xmlns:a14="http://schemas.microsoft.com/office/drawing/2010/main" xmlns="" w="9525">
+                <a14:hiddenLine xmlns="" xmlns:a14="http://schemas.microsoft.com/office/drawing/2010/main" w="9525">
                   <a:solidFill>
                     <a:srgbClr val="000000"/>
                   </a:solidFill>
@@ -4981,7 +4981,7 @@
             </a:ln>
             <a:extLst>
               <a:ext uri="{91240B29-F687-4f45-9708-019B960494DF}">
-                <a14:hiddenLine xmlns:a14="http://schemas.microsoft.com/office/drawing/2010/main" xmlns="" w="9525">
+                <a14:hiddenLine xmlns="" xmlns:a14="http://schemas.microsoft.com/office/drawing/2010/main" w="9525">
                   <a:solidFill>
                     <a:srgbClr val="000000"/>
                   </a:solidFill>
@@ -5121,7 +5121,7 @@
           <a:p>
             <a:fld id="{48A87A34-81AB-432B-8DAE-1953F412C126}" type="datetimeFigureOut">
               <a:rPr lang="en-US" smtClean="0"/>
-              <a:t>4/9/2020</a:t>
+              <a:t>4/10/2020</a:t>
             </a:fld>
             <a:endParaRPr lang="en-US" dirty="0"/>
           </a:p>
@@ -5388,7 +5388,7 @@
           <a:p>
             <a:fld id="{48A87A34-81AB-432B-8DAE-1953F412C126}" type="datetimeFigureOut">
               <a:rPr lang="en-US" smtClean="0"/>
-              <a:t>4/9/2020</a:t>
+              <a:t>4/10/2020</a:t>
             </a:fld>
             <a:endParaRPr lang="en-US" dirty="0"/>
           </a:p>
@@ -5584,7 +5584,7 @@
           <a:p>
             <a:fld id="{48A87A34-81AB-432B-8DAE-1953F412C126}" type="datetimeFigureOut">
               <a:rPr lang="en-US" smtClean="0"/>
-              <a:t>4/9/2020</a:t>
+              <a:t>4/10/2020</a:t>
             </a:fld>
             <a:endParaRPr lang="en-US" dirty="0"/>
           </a:p>
@@ -5847,7 +5847,7 @@
           <a:p>
             <a:fld id="{48A87A34-81AB-432B-8DAE-1953F412C126}" type="datetimeFigureOut">
               <a:rPr lang="en-US" smtClean="0"/>
-              <a:t>4/9/2020</a:t>
+              <a:t>4/10/2020</a:t>
             </a:fld>
             <a:endParaRPr lang="en-US" dirty="0"/>
           </a:p>
@@ -6281,7 +6281,7 @@
           <a:p>
             <a:fld id="{48A87A34-81AB-432B-8DAE-1953F412C126}" type="datetimeFigureOut">
               <a:rPr lang="en-US" smtClean="0"/>
-              <a:t>4/9/2020</a:t>
+              <a:t>4/10/2020</a:t>
             </a:fld>
             <a:endParaRPr lang="en-US" dirty="0"/>
           </a:p>
@@ -6827,7 +6827,7 @@
           <a:p>
             <a:fld id="{48A87A34-81AB-432B-8DAE-1953F412C126}" type="datetimeFigureOut">
               <a:rPr lang="en-US" smtClean="0"/>
-              <a:t>4/9/2020</a:t>
+              <a:t>4/10/2020</a:t>
             </a:fld>
             <a:endParaRPr lang="en-US" dirty="0"/>
           </a:p>
@@ -7547,7 +7547,7 @@
           <a:p>
             <a:fld id="{48A87A34-81AB-432B-8DAE-1953F412C126}" type="datetimeFigureOut">
               <a:rPr lang="en-US" smtClean="0"/>
-              <a:t>4/9/2020</a:t>
+              <a:t>4/10/2020</a:t>
             </a:fld>
             <a:endParaRPr lang="en-US" dirty="0"/>
           </a:p>
@@ -7717,7 +7717,7 @@
           <a:p>
             <a:fld id="{48A87A34-81AB-432B-8DAE-1953F412C126}" type="datetimeFigureOut">
               <a:rPr lang="en-US" smtClean="0"/>
-              <a:t>4/9/2020</a:t>
+              <a:t>4/10/2020</a:t>
             </a:fld>
             <a:endParaRPr lang="en-US" dirty="0"/>
           </a:p>
@@ -7897,7 +7897,7 @@
           <a:p>
             <a:fld id="{48A87A34-81AB-432B-8DAE-1953F412C126}" type="datetimeFigureOut">
               <a:rPr lang="en-US" smtClean="0"/>
-              <a:t>4/9/2020</a:t>
+              <a:t>4/10/2020</a:t>
             </a:fld>
             <a:endParaRPr lang="en-US" dirty="0"/>
           </a:p>
@@ -8067,7 +8067,7 @@
           <a:p>
             <a:fld id="{48A87A34-81AB-432B-8DAE-1953F412C126}" type="datetimeFigureOut">
               <a:rPr lang="en-US" smtClean="0"/>
-              <a:t>4/9/2020</a:t>
+              <a:t>4/10/2020</a:t>
             </a:fld>
             <a:endParaRPr lang="en-US" dirty="0"/>
           </a:p>
@@ -8317,7 +8317,7 @@
           <a:p>
             <a:fld id="{48A87A34-81AB-432B-8DAE-1953F412C126}" type="datetimeFigureOut">
               <a:rPr lang="en-US" smtClean="0"/>
-              <a:t>4/9/2020</a:t>
+              <a:t>4/10/2020</a:t>
             </a:fld>
             <a:endParaRPr lang="en-US" dirty="0"/>
           </a:p>
@@ -8549,7 +8549,7 @@
           <a:p>
             <a:fld id="{48A87A34-81AB-432B-8DAE-1953F412C126}" type="datetimeFigureOut">
               <a:rPr lang="en-US" smtClean="0"/>
-              <a:t>4/9/2020</a:t>
+              <a:t>4/10/2020</a:t>
             </a:fld>
             <a:endParaRPr lang="en-US" dirty="0"/>
           </a:p>
@@ -8930,7 +8930,7 @@
           <a:p>
             <a:fld id="{48A87A34-81AB-432B-8DAE-1953F412C126}" type="datetimeFigureOut">
               <a:rPr lang="en-US" smtClean="0"/>
-              <a:t>4/9/2020</a:t>
+              <a:t>4/10/2020</a:t>
             </a:fld>
             <a:endParaRPr lang="en-US" dirty="0"/>
           </a:p>
@@ -9048,7 +9048,7 @@
           <a:p>
             <a:fld id="{48A87A34-81AB-432B-8DAE-1953F412C126}" type="datetimeFigureOut">
               <a:rPr lang="en-US" smtClean="0"/>
-              <a:t>4/9/2020</a:t>
+              <a:t>4/10/2020</a:t>
             </a:fld>
             <a:endParaRPr lang="en-US" dirty="0"/>
           </a:p>
@@ -9143,7 +9143,7 @@
           <a:p>
             <a:fld id="{48A87A34-81AB-432B-8DAE-1953F412C126}" type="datetimeFigureOut">
               <a:rPr lang="en-US" smtClean="0"/>
-              <a:t>4/9/2020</a:t>
+              <a:t>4/10/2020</a:t>
             </a:fld>
             <a:endParaRPr lang="en-US" dirty="0"/>
           </a:p>
@@ -9392,7 +9392,7 @@
           <a:p>
             <a:fld id="{48A87A34-81AB-432B-8DAE-1953F412C126}" type="datetimeFigureOut">
               <a:rPr lang="en-US" smtClean="0"/>
-              <a:t>4/9/2020</a:t>
+              <a:t>4/10/2020</a:t>
             </a:fld>
             <a:endParaRPr lang="en-US" dirty="0"/>
           </a:p>
@@ -9672,7 +9672,7 @@
           <a:p>
             <a:fld id="{48A87A34-81AB-432B-8DAE-1953F412C126}" type="datetimeFigureOut">
               <a:rPr lang="en-US" smtClean="0"/>
-              <a:t>4/9/2020</a:t>
+              <a:t>4/10/2020</a:t>
             </a:fld>
             <a:endParaRPr lang="en-US" dirty="0"/>
           </a:p>
@@ -9795,7 +9795,7 @@
           <a:noFill/>
           <a:extLst>
             <a:ext uri="{909E8E84-426E-40dd-AFC4-6F175D3DCCD1}">
-              <a14:hiddenFill xmlns:a14="http://schemas.microsoft.com/office/drawing/2010/main" xmlns="">
+              <a14:hiddenFill xmlns="" xmlns:a14="http://schemas.microsoft.com/office/drawing/2010/main">
                 <a:solidFill>
                   <a:srgbClr val="FFFFFF"/>
                 </a:solidFill>
@@ -9869,7 +9869,7 @@
               </a:ln>
               <a:extLst>
                 <a:ext uri="{91240B29-F687-4f45-9708-019B960494DF}">
-                  <a14:hiddenLine xmlns:a14="http://schemas.microsoft.com/office/drawing/2010/main" xmlns="" w="9525">
+                  <a14:hiddenLine xmlns="" xmlns:a14="http://schemas.microsoft.com/office/drawing/2010/main" w="9525">
                     <a:solidFill>
                       <a:srgbClr val="000000"/>
                     </a:solidFill>
@@ -9959,7 +9959,7 @@
               </a:ln>
               <a:extLst>
                 <a:ext uri="{91240B29-F687-4f45-9708-019B960494DF}">
-                  <a14:hiddenLine xmlns:a14="http://schemas.microsoft.com/office/drawing/2010/main" xmlns="" w="9525">
+                  <a14:hiddenLine xmlns="" xmlns:a14="http://schemas.microsoft.com/office/drawing/2010/main" w="9525">
                     <a:solidFill>
                       <a:srgbClr val="000000"/>
                     </a:solidFill>
@@ -10049,7 +10049,7 @@
               </a:ln>
               <a:extLst>
                 <a:ext uri="{91240B29-F687-4f45-9708-019B960494DF}">
-                  <a14:hiddenLine xmlns:a14="http://schemas.microsoft.com/office/drawing/2010/main" xmlns="" w="9525">
+                  <a14:hiddenLine xmlns="" xmlns:a14="http://schemas.microsoft.com/office/drawing/2010/main" w="9525">
                     <a:solidFill>
                       <a:srgbClr val="000000"/>
                     </a:solidFill>
@@ -10111,7 +10111,7 @@
               </a:ln>
               <a:extLst>
                 <a:ext uri="{91240B29-F687-4f45-9708-019B960494DF}">
-                  <a14:hiddenLine xmlns:a14="http://schemas.microsoft.com/office/drawing/2010/main" xmlns="" w="9525">
+                  <a14:hiddenLine xmlns="" xmlns:a14="http://schemas.microsoft.com/office/drawing/2010/main" w="9525">
                     <a:solidFill>
                       <a:srgbClr val="000000"/>
                     </a:solidFill>
@@ -10201,7 +10201,7 @@
               </a:ln>
               <a:extLst>
                 <a:ext uri="{91240B29-F687-4f45-9708-019B960494DF}">
-                  <a14:hiddenLine xmlns:a14="http://schemas.microsoft.com/office/drawing/2010/main" xmlns="" w="9525">
+                  <a14:hiddenLine xmlns="" xmlns:a14="http://schemas.microsoft.com/office/drawing/2010/main" w="9525">
                     <a:solidFill>
                       <a:srgbClr val="000000"/>
                     </a:solidFill>
@@ -10263,7 +10263,7 @@
               </a:ln>
               <a:extLst>
                 <a:ext uri="{91240B29-F687-4f45-9708-019B960494DF}">
-                  <a14:hiddenLine xmlns:a14="http://schemas.microsoft.com/office/drawing/2010/main" xmlns="" w="9525">
+                  <a14:hiddenLine xmlns="" xmlns:a14="http://schemas.microsoft.com/office/drawing/2010/main" w="9525">
                     <a:solidFill>
                       <a:srgbClr val="000000"/>
                     </a:solidFill>
@@ -10325,7 +10325,7 @@
               </a:ln>
               <a:extLst>
                 <a:ext uri="{91240B29-F687-4f45-9708-019B960494DF}">
-                  <a14:hiddenLine xmlns:a14="http://schemas.microsoft.com/office/drawing/2010/main" xmlns="" w="9525">
+                  <a14:hiddenLine xmlns="" xmlns:a14="http://schemas.microsoft.com/office/drawing/2010/main" w="9525">
                     <a:solidFill>
                       <a:srgbClr val="000000"/>
                     </a:solidFill>
@@ -10415,7 +10415,7 @@
               </a:ln>
               <a:extLst>
                 <a:ext uri="{91240B29-F687-4f45-9708-019B960494DF}">
-                  <a14:hiddenLine xmlns:a14="http://schemas.microsoft.com/office/drawing/2010/main" xmlns="" w="9525">
+                  <a14:hiddenLine xmlns="" xmlns:a14="http://schemas.microsoft.com/office/drawing/2010/main" w="9525">
                     <a:solidFill>
                       <a:srgbClr val="000000"/>
                     </a:solidFill>
@@ -10505,7 +10505,7 @@
               </a:ln>
               <a:extLst>
                 <a:ext uri="{91240B29-F687-4f45-9708-019B960494DF}">
-                  <a14:hiddenLine xmlns:a14="http://schemas.microsoft.com/office/drawing/2010/main" xmlns="" w="9525">
+                  <a14:hiddenLine xmlns="" xmlns:a14="http://schemas.microsoft.com/office/drawing/2010/main" w="9525">
                     <a:solidFill>
                       <a:srgbClr val="000000"/>
                     </a:solidFill>
@@ -10567,7 +10567,7 @@
               </a:ln>
               <a:extLst>
                 <a:ext uri="{91240B29-F687-4f45-9708-019B960494DF}">
-                  <a14:hiddenLine xmlns:a14="http://schemas.microsoft.com/office/drawing/2010/main" xmlns="" w="9525">
+                  <a14:hiddenLine xmlns="" xmlns:a14="http://schemas.microsoft.com/office/drawing/2010/main" w="9525">
                     <a:solidFill>
                       <a:srgbClr val="000000"/>
                     </a:solidFill>
@@ -10677,7 +10677,7 @@
               </a:ln>
               <a:extLst>
                 <a:ext uri="{91240B29-F687-4f45-9708-019B960494DF}">
-                  <a14:hiddenLine xmlns:a14="http://schemas.microsoft.com/office/drawing/2010/main" xmlns="" w="9525">
+                  <a14:hiddenLine xmlns="" xmlns:a14="http://schemas.microsoft.com/office/drawing/2010/main" w="9525">
                     <a:solidFill>
                       <a:srgbClr val="000000"/>
                     </a:solidFill>
@@ -10761,7 +10761,7 @@
               </a:ln>
               <a:extLst>
                 <a:ext uri="{91240B29-F687-4f45-9708-019B960494DF}">
-                  <a14:hiddenLine xmlns:a14="http://schemas.microsoft.com/office/drawing/2010/main" xmlns="" w="9525">
+                  <a14:hiddenLine xmlns="" xmlns:a14="http://schemas.microsoft.com/office/drawing/2010/main" w="9525">
                     <a:solidFill>
                       <a:srgbClr val="000000"/>
                     </a:solidFill>
@@ -10823,7 +10823,7 @@
               </a:ln>
               <a:extLst>
                 <a:ext uri="{91240B29-F687-4f45-9708-019B960494DF}">
-                  <a14:hiddenLine xmlns:a14="http://schemas.microsoft.com/office/drawing/2010/main" xmlns="" w="9525">
+                  <a14:hiddenLine xmlns="" xmlns:a14="http://schemas.microsoft.com/office/drawing/2010/main" w="9525">
                     <a:solidFill>
                       <a:srgbClr val="000000"/>
                     </a:solidFill>
@@ -10885,7 +10885,7 @@
               </a:ln>
               <a:extLst>
                 <a:ext uri="{91240B29-F687-4f45-9708-019B960494DF}">
-                  <a14:hiddenLine xmlns:a14="http://schemas.microsoft.com/office/drawing/2010/main" xmlns="" w="9525">
+                  <a14:hiddenLine xmlns="" xmlns:a14="http://schemas.microsoft.com/office/drawing/2010/main" w="9525">
                     <a:solidFill>
                       <a:srgbClr val="000000"/>
                     </a:solidFill>
@@ -10975,7 +10975,7 @@
               </a:ln>
               <a:extLst>
                 <a:ext uri="{91240B29-F687-4f45-9708-019B960494DF}">
-                  <a14:hiddenLine xmlns:a14="http://schemas.microsoft.com/office/drawing/2010/main" xmlns="" w="9525">
+                  <a14:hiddenLine xmlns="" xmlns:a14="http://schemas.microsoft.com/office/drawing/2010/main" w="9525">
                     <a:solidFill>
                       <a:srgbClr val="000000"/>
                     </a:solidFill>
@@ -11009,7 +11009,7 @@
               </a:ln>
               <a:extLst>
                 <a:ext uri="{91240B29-F687-4f45-9708-019B960494DF}">
-                  <a14:hiddenLine xmlns:a14="http://schemas.microsoft.com/office/drawing/2010/main" xmlns="" w="9525">
+                  <a14:hiddenLine xmlns="" xmlns:a14="http://schemas.microsoft.com/office/drawing/2010/main" w="9525">
                     <a:solidFill>
                       <a:srgbClr val="000000"/>
                     </a:solidFill>
@@ -11074,7 +11074,7 @@
               </a:ln>
               <a:extLst>
                 <a:ext uri="{91240B29-F687-4f45-9708-019B960494DF}">
-                  <a14:hiddenLine xmlns:a14="http://schemas.microsoft.com/office/drawing/2010/main" xmlns="" w="9525">
+                  <a14:hiddenLine xmlns="" xmlns:a14="http://schemas.microsoft.com/office/drawing/2010/main" w="9525">
                     <a:solidFill>
                       <a:srgbClr val="000000"/>
                     </a:solidFill>
@@ -11164,7 +11164,7 @@
               </a:ln>
               <a:extLst>
                 <a:ext uri="{91240B29-F687-4f45-9708-019B960494DF}">
-                  <a14:hiddenLine xmlns:a14="http://schemas.microsoft.com/office/drawing/2010/main" xmlns="" w="9525">
+                  <a14:hiddenLine xmlns="" xmlns:a14="http://schemas.microsoft.com/office/drawing/2010/main" w="9525">
                     <a:solidFill>
                       <a:srgbClr val="000000"/>
                     </a:solidFill>
@@ -11226,7 +11226,7 @@
               </a:ln>
               <a:extLst>
                 <a:ext uri="{91240B29-F687-4f45-9708-019B960494DF}">
-                  <a14:hiddenLine xmlns:a14="http://schemas.microsoft.com/office/drawing/2010/main" xmlns="" w="9525">
+                  <a14:hiddenLine xmlns="" xmlns:a14="http://schemas.microsoft.com/office/drawing/2010/main" w="9525">
                     <a:solidFill>
                       <a:srgbClr val="000000"/>
                     </a:solidFill>
@@ -11316,7 +11316,7 @@
               </a:ln>
               <a:extLst>
                 <a:ext uri="{91240B29-F687-4f45-9708-019B960494DF}">
-                  <a14:hiddenLine xmlns:a14="http://schemas.microsoft.com/office/drawing/2010/main" xmlns="" w="9525">
+                  <a14:hiddenLine xmlns="" xmlns:a14="http://schemas.microsoft.com/office/drawing/2010/main" w="9525">
                     <a:solidFill>
                       <a:srgbClr val="000000"/>
                     </a:solidFill>
@@ -11381,7 +11381,7 @@
               </a:ln>
               <a:extLst>
                 <a:ext uri="{91240B29-F687-4f45-9708-019B960494DF}">
-                  <a14:hiddenLine xmlns:a14="http://schemas.microsoft.com/office/drawing/2010/main" xmlns="" w="9525">
+                  <a14:hiddenLine xmlns="" xmlns:a14="http://schemas.microsoft.com/office/drawing/2010/main" w="9525">
                     <a:solidFill>
                       <a:srgbClr val="000000"/>
                     </a:solidFill>
@@ -11443,7 +11443,7 @@
               </a:ln>
               <a:extLst>
                 <a:ext uri="{91240B29-F687-4f45-9708-019B960494DF}">
-                  <a14:hiddenLine xmlns:a14="http://schemas.microsoft.com/office/drawing/2010/main" xmlns="" w="9525">
+                  <a14:hiddenLine xmlns="" xmlns:a14="http://schemas.microsoft.com/office/drawing/2010/main" w="9525">
                     <a:solidFill>
                       <a:srgbClr val="000000"/>
                     </a:solidFill>
@@ -11533,7 +11533,7 @@
               </a:ln>
               <a:extLst>
                 <a:ext uri="{91240B29-F687-4f45-9708-019B960494DF}">
-                  <a14:hiddenLine xmlns:a14="http://schemas.microsoft.com/office/drawing/2010/main" xmlns="" w="9525">
+                  <a14:hiddenLine xmlns="" xmlns:a14="http://schemas.microsoft.com/office/drawing/2010/main" w="9525">
                     <a:solidFill>
                       <a:srgbClr val="000000"/>
                     </a:solidFill>
@@ -11623,7 +11623,7 @@
               </a:ln>
               <a:extLst>
                 <a:ext uri="{91240B29-F687-4f45-9708-019B960494DF}">
-                  <a14:hiddenLine xmlns:a14="http://schemas.microsoft.com/office/drawing/2010/main" xmlns="" w="9525">
+                  <a14:hiddenLine xmlns="" xmlns:a14="http://schemas.microsoft.com/office/drawing/2010/main" w="9525">
                     <a:solidFill>
                       <a:srgbClr val="000000"/>
                     </a:solidFill>
@@ -11688,7 +11688,7 @@
               </a:ln>
               <a:extLst>
                 <a:ext uri="{91240B29-F687-4f45-9708-019B960494DF}">
-                  <a14:hiddenLine xmlns:a14="http://schemas.microsoft.com/office/drawing/2010/main" xmlns="" w="9525">
+                  <a14:hiddenLine xmlns="" xmlns:a14="http://schemas.microsoft.com/office/drawing/2010/main" w="9525">
                     <a:solidFill>
                       <a:srgbClr val="000000"/>
                     </a:solidFill>
@@ -11808,7 +11808,7 @@
               </a:ln>
               <a:extLst>
                 <a:ext uri="{91240B29-F687-4f45-9708-019B960494DF}">
-                  <a14:hiddenLine xmlns:a14="http://schemas.microsoft.com/office/drawing/2010/main" xmlns="" w="9525">
+                  <a14:hiddenLine xmlns="" xmlns:a14="http://schemas.microsoft.com/office/drawing/2010/main" w="9525">
                     <a:solidFill>
                       <a:srgbClr val="000000"/>
                     </a:solidFill>
@@ -11889,7 +11889,7 @@
               </a:ln>
               <a:extLst>
                 <a:ext uri="{91240B29-F687-4f45-9708-019B960494DF}">
-                  <a14:hiddenLine xmlns:a14="http://schemas.microsoft.com/office/drawing/2010/main" xmlns="" w="9525">
+                  <a14:hiddenLine xmlns="" xmlns:a14="http://schemas.microsoft.com/office/drawing/2010/main" w="9525">
                     <a:solidFill>
                       <a:srgbClr val="000000"/>
                     </a:solidFill>
@@ -12004,7 +12004,7 @@
               </a:ln>
               <a:extLst>
                 <a:ext uri="{91240B29-F687-4f45-9708-019B960494DF}">
-                  <a14:hiddenLine xmlns:a14="http://schemas.microsoft.com/office/drawing/2010/main" xmlns="" w="9525">
+                  <a14:hiddenLine xmlns="" xmlns:a14="http://schemas.microsoft.com/office/drawing/2010/main" w="9525">
                     <a:solidFill>
                       <a:srgbClr val="000000"/>
                     </a:solidFill>
@@ -12094,7 +12094,7 @@
               </a:ln>
               <a:extLst>
                 <a:ext uri="{91240B29-F687-4f45-9708-019B960494DF}">
-                  <a14:hiddenLine xmlns:a14="http://schemas.microsoft.com/office/drawing/2010/main" xmlns="" w="9525">
+                  <a14:hiddenLine xmlns="" xmlns:a14="http://schemas.microsoft.com/office/drawing/2010/main" w="9525">
                     <a:solidFill>
                       <a:srgbClr val="000000"/>
                     </a:solidFill>
@@ -12159,7 +12159,7 @@
               </a:ln>
               <a:extLst>
                 <a:ext uri="{91240B29-F687-4f45-9708-019B960494DF}">
-                  <a14:hiddenLine xmlns:a14="http://schemas.microsoft.com/office/drawing/2010/main" xmlns="" w="9525">
+                  <a14:hiddenLine xmlns="" xmlns:a14="http://schemas.microsoft.com/office/drawing/2010/main" w="9525">
                     <a:solidFill>
                       <a:srgbClr val="000000"/>
                     </a:solidFill>
@@ -12249,7 +12249,7 @@
               </a:ln>
               <a:extLst>
                 <a:ext uri="{91240B29-F687-4f45-9708-019B960494DF}">
-                  <a14:hiddenLine xmlns:a14="http://schemas.microsoft.com/office/drawing/2010/main" xmlns="" w="9525">
+                  <a14:hiddenLine xmlns="" xmlns:a14="http://schemas.microsoft.com/office/drawing/2010/main" w="9525">
                     <a:solidFill>
                       <a:srgbClr val="000000"/>
                     </a:solidFill>
@@ -12317,7 +12317,7 @@
               </a:ln>
               <a:extLst>
                 <a:ext uri="{91240B29-F687-4f45-9708-019B960494DF}">
-                  <a14:hiddenLine xmlns:a14="http://schemas.microsoft.com/office/drawing/2010/main" xmlns="" w="9525">
+                  <a14:hiddenLine xmlns="" xmlns:a14="http://schemas.microsoft.com/office/drawing/2010/main" w="9525">
                     <a:solidFill>
                       <a:srgbClr val="000000"/>
                     </a:solidFill>
@@ -12407,7 +12407,7 @@
               </a:ln>
               <a:extLst>
                 <a:ext uri="{91240B29-F687-4f45-9708-019B960494DF}">
-                  <a14:hiddenLine xmlns:a14="http://schemas.microsoft.com/office/drawing/2010/main" xmlns="" w="9525">
+                  <a14:hiddenLine xmlns="" xmlns:a14="http://schemas.microsoft.com/office/drawing/2010/main" w="9525">
                     <a:solidFill>
                       <a:srgbClr val="000000"/>
                     </a:solidFill>
@@ -12475,7 +12475,7 @@
               </a:ln>
               <a:extLst>
                 <a:ext uri="{91240B29-F687-4f45-9708-019B960494DF}">
-                  <a14:hiddenLine xmlns:a14="http://schemas.microsoft.com/office/drawing/2010/main" xmlns="" w="9525">
+                  <a14:hiddenLine xmlns="" xmlns:a14="http://schemas.microsoft.com/office/drawing/2010/main" w="9525">
                     <a:solidFill>
                       <a:srgbClr val="000000"/>
                     </a:solidFill>
@@ -12565,7 +12565,7 @@
               </a:ln>
               <a:extLst>
                 <a:ext uri="{91240B29-F687-4f45-9708-019B960494DF}">
-                  <a14:hiddenLine xmlns:a14="http://schemas.microsoft.com/office/drawing/2010/main" xmlns="" w="9525">
+                  <a14:hiddenLine xmlns="" xmlns:a14="http://schemas.microsoft.com/office/drawing/2010/main" w="9525">
                     <a:solidFill>
                       <a:srgbClr val="000000"/>
                     </a:solidFill>
@@ -12599,7 +12599,7 @@
               </a:ln>
               <a:extLst>
                 <a:ext uri="{91240B29-F687-4f45-9708-019B960494DF}">
-                  <a14:hiddenLine xmlns:a14="http://schemas.microsoft.com/office/drawing/2010/main" xmlns="" w="9525">
+                  <a14:hiddenLine xmlns="" xmlns:a14="http://schemas.microsoft.com/office/drawing/2010/main" w="9525">
                     <a:solidFill>
                       <a:srgbClr val="000000"/>
                     </a:solidFill>
@@ -12740,7 +12740,7 @@
             <a:fld id="{48A87A34-81AB-432B-8DAE-1953F412C126}" type="datetimeFigureOut">
               <a:rPr lang="en-US" smtClean="0"/>
               <a:pPr/>
-              <a:t>4/9/2020</a:t>
+              <a:t>4/10/2020</a:t>
             </a:fld>
             <a:endParaRPr lang="en-US" dirty="0"/>
           </a:p>
@@ -13334,7 +13334,7 @@
             <a:noFill/>
             <a:extLst>
               <a:ext uri="{909E8E84-426E-40dd-AFC4-6F175D3DCCD1}">
-                <a14:hiddenFill xmlns:p14="http://schemas.microsoft.com/office/powerpoint/2010/main" xmlns:a14="http://schemas.microsoft.com/office/drawing/2010/main" xmlns:a16="http://schemas.microsoft.com/office/drawing/2014/main" xmlns="">
+                <a14:hiddenFill xmlns="" xmlns:a16="http://schemas.microsoft.com/office/drawing/2014/main" xmlns:a14="http://schemas.microsoft.com/office/drawing/2010/main" xmlns:p14="http://schemas.microsoft.com/office/powerpoint/2010/main">
                   <a:solidFill>
                     <a:srgbClr val="FFFFFF"/>
                   </a:solidFill>
@@ -15417,6 +15417,17 @@
               <a:rPr lang="en-US" dirty="0"/>
               <a:t>Carlos Ramirez (2018-6055)</a:t>
             </a:r>
+          </a:p>
+          <a:p>
+            <a:pPr algn="ctr"/>
+            <a:r>
+              <a:rPr lang="es-DO" dirty="0"/>
+              <a:t>Oliver de Jesús rosario reyes (2017-5541)</a:t>
+            </a:r>
+          </a:p>
+          <a:p>
+            <a:pPr algn="ctr"/>
+            <a:endParaRPr lang="en-US" dirty="0"/>
           </a:p>
         </p:txBody>
       </p:sp>
@@ -18170,15 +18181,6 @@
 </file>
 
 <file path=customXml/item2.xml><?xml version="1.0" encoding="utf-8"?>
-<?mso-contentType ?>
-<FormTemplates xmlns="http://schemas.microsoft.com/sharepoint/v3/contenttype/forms">
-  <Display>DocumentLibraryForm</Display>
-  <Edit>DocumentLibraryForm</Edit>
-  <New>DocumentLibraryForm</New>
-</FormTemplates>
-</file>
-
-<file path=customXml/item3.xml><?xml version="1.0" encoding="utf-8"?>
 <ct:contentTypeSchema xmlns:ct="http://schemas.microsoft.com/office/2006/metadata/contentType" xmlns:ma="http://schemas.microsoft.com/office/2006/metadata/properties/metaAttributes" ct:_="" ma:_="" ma:contentTypeName="Document" ma:contentTypeID="0x01010079F111ED35F8CC479449609E8A0923A6" ma:contentTypeVersion="11" ma:contentTypeDescription="Create a new document." ma:contentTypeScope="" ma:versionID="9677210f24a1be23c92c90fd886aa0aa">
   <xsd:schema xmlns:xsd="http://www.w3.org/2001/XMLSchema" xmlns:xs="http://www.w3.org/2001/XMLSchema" xmlns:p="http://schemas.microsoft.com/office/2006/metadata/properties" xmlns:ns2="71af3243-3dd4-4a8d-8c0d-dd76da1f02a5" xmlns:ns3="16c05727-aa75-4e4a-9b5f-8a80a1165891" targetNamespace="http://schemas.microsoft.com/office/2006/metadata/properties" ma:root="true" ma:fieldsID="60e05723c5c1908df1a1a4ebf11d344e" ns2:_="" ns3:_="">
     <xsd:import namespace="71af3243-3dd4-4a8d-8c0d-dd76da1f02a5"/>
@@ -18389,6 +18391,15 @@
 </ct:contentTypeSchema>
 </file>
 
+<file path=customXml/item3.xml><?xml version="1.0" encoding="utf-8"?>
+<?mso-contentType ?>
+<FormTemplates xmlns="http://schemas.microsoft.com/sharepoint/v3/contenttype/forms">
+  <Display>DocumentLibraryForm</Display>
+  <Edit>DocumentLibraryForm</Edit>
+  <New>DocumentLibraryForm</New>
+</FormTemplates>
+</file>
+
 <file path=customXml/itemProps1.xml><?xml version="1.0" encoding="utf-8"?>
 <ds:datastoreItem xmlns:ds="http://schemas.openxmlformats.org/officeDocument/2006/customXml" ds:itemID="{0A938410-2173-430A-9B92-20257D39BD88}">
   <ds:schemaRefs>
@@ -18400,14 +18411,6 @@
 </file>
 
 <file path=customXml/itemProps2.xml><?xml version="1.0" encoding="utf-8"?>
-<ds:datastoreItem xmlns:ds="http://schemas.openxmlformats.org/officeDocument/2006/customXml" ds:itemID="{80B6055E-F2DC-412A-8B07-D3793807DA86}">
-  <ds:schemaRefs>
-    <ds:schemaRef ds:uri="http://schemas.microsoft.com/sharepoint/v3/contenttype/forms"/>
-  </ds:schemaRefs>
-</ds:datastoreItem>
-</file>
-
-<file path=customXml/itemProps3.xml><?xml version="1.0" encoding="utf-8"?>
 <ds:datastoreItem xmlns:ds="http://schemas.openxmlformats.org/officeDocument/2006/customXml" ds:itemID="{E1BF91BB-6045-4869-8145-5C20AAEE9ACC}">
   <ds:schemaRefs>
     <ds:schemaRef ds:uri="http://schemas.microsoft.com/office/2006/metadata/contentType"/>
@@ -18424,4 +18427,12 @@
     <ds:schemaRef ds:uri="http://schemas.microsoft.com/internal/obd"/>
   </ds:schemaRefs>
 </ds:datastoreItem>
+</file>
+
+<file path=customXml/itemProps3.xml><?xml version="1.0" encoding="utf-8"?>
+<ds:datastoreItem xmlns:ds="http://schemas.openxmlformats.org/officeDocument/2006/customXml" ds:itemID="{80B6055E-F2DC-412A-8B07-D3793807DA86}">
+  <ds:schemaRefs>
+    <ds:schemaRef ds:uri="http://schemas.microsoft.com/sharepoint/v3/contenttype/forms"/>
+  </ds:schemaRefs>
+</ds:datastoreItem>
 </file>
</xml_diff>